<commit_message>
más espacio para la revisón de documentos
</commit_message>
<xml_diff>
--- a/propuestas_resolucion.pptx
+++ b/propuestas_resolucion.pptx
@@ -3341,7 +3341,7 @@
           <a:p/>
           <a:p>
             <a:pPr algn="l">
-              <a:defRPr sz="1000" b="0">
+              <a:defRPr sz="1200" b="0">
                 <a:solidFill>
                   <a:srgbClr val="FFFFFF"/>
                 </a:solidFill>
@@ -3402,7 +3402,7 @@
         <p:spPr>
           <a:xfrm>
             <a:off x="91440" y="1828800"/>
-            <a:ext cx="3657600" cy="4572000"/>
+            <a:ext cx="3657600" cy="4846320"/>
           </a:xfrm>
           <a:prstGeom prst="roundRect">
             <a:avLst/>
@@ -3649,7 +3649,7 @@
         </p:nvSpPr>
         <p:spPr>
           <a:xfrm>
-            <a:off x="320040" y="5486400"/>
+            <a:off x="320040" y="6035040"/>
             <a:ext cx="3200400" cy="457200"/>
           </a:xfrm>
           <a:prstGeom prst="roundRect">
@@ -3704,7 +3704,7 @@
         <p:spPr>
           <a:xfrm>
             <a:off x="4206240" y="1828800"/>
-            <a:ext cx="3657600" cy="4572000"/>
+            <a:ext cx="3657600" cy="4846320"/>
           </a:xfrm>
           <a:prstGeom prst="roundRect">
             <a:avLst/>
@@ -3959,7 +3959,7 @@
         </p:nvSpPr>
         <p:spPr>
           <a:xfrm>
-            <a:off x="4434840" y="5486400"/>
+            <a:off x="4434840" y="6035040"/>
             <a:ext cx="3200400" cy="457200"/>
           </a:xfrm>
           <a:prstGeom prst="roundRect">
@@ -4014,7 +4014,7 @@
         <p:spPr>
           <a:xfrm>
             <a:off x="8321040" y="1828800"/>
-            <a:ext cx="3657600" cy="4572000"/>
+            <a:ext cx="3657600" cy="4846320"/>
           </a:xfrm>
           <a:prstGeom prst="roundRect">
             <a:avLst/>
@@ -4213,7 +4213,7 @@
         </p:nvSpPr>
         <p:spPr>
           <a:xfrm>
-            <a:off x="8549640" y="5486400"/>
+            <a:off x="8549640" y="6035040"/>
             <a:ext cx="3200400" cy="457200"/>
           </a:xfrm>
           <a:prstGeom prst="roundRect">
@@ -4502,7 +4502,7 @@
           <a:p/>
           <a:p>
             <a:pPr algn="l">
-              <a:defRPr sz="1000" b="0">
+              <a:defRPr sz="1200" b="0">
                 <a:solidFill>
                   <a:srgbClr val="FFFFFF"/>
                 </a:solidFill>
@@ -4513,7 +4513,7 @@
             </a:r>
             <a:br/>
             <a:r>
-              <a:t> El estudiante solicita una beca debido a su situación financiera y se sugiere aprobar la solicitud por su deuda.</a:t>
+              <a:t> El estudiante solicita una beca porque tiene una deuda vencida y cumple con los requisitos establecidos.</a:t>
             </a:r>
           </a:p>
         </p:txBody>
@@ -4563,7 +4563,7 @@
         <p:spPr>
           <a:xfrm>
             <a:off x="91440" y="1828800"/>
-            <a:ext cx="3657600" cy="4572000"/>
+            <a:ext cx="3657600" cy="4846320"/>
           </a:xfrm>
           <a:prstGeom prst="roundRect">
             <a:avLst/>
@@ -4802,7 +4802,7 @@
         </p:nvSpPr>
         <p:spPr>
           <a:xfrm>
-            <a:off x="320040" y="5486400"/>
+            <a:off x="320040" y="6035040"/>
             <a:ext cx="3200400" cy="457200"/>
           </a:xfrm>
           <a:prstGeom prst="roundRect">
@@ -4857,7 +4857,7 @@
         <p:spPr>
           <a:xfrm>
             <a:off x="4206240" y="1828800"/>
-            <a:ext cx="3657600" cy="4572000"/>
+            <a:ext cx="3657600" cy="4846320"/>
           </a:xfrm>
           <a:prstGeom prst="roundRect">
             <a:avLst/>
@@ -5112,7 +5112,7 @@
         </p:nvSpPr>
         <p:spPr>
           <a:xfrm>
-            <a:off x="4434840" y="5486400"/>
+            <a:off x="4434840" y="6035040"/>
             <a:ext cx="3200400" cy="457200"/>
           </a:xfrm>
           <a:prstGeom prst="roundRect">
@@ -5167,7 +5167,7 @@
         <p:spPr>
           <a:xfrm>
             <a:off x="8321040" y="1828800"/>
-            <a:ext cx="3657600" cy="4572000"/>
+            <a:ext cx="3657600" cy="4846320"/>
           </a:xfrm>
           <a:prstGeom prst="roundRect">
             <a:avLst/>
@@ -5291,7 +5291,7 @@
               <a:defRPr sz="1200"/>
             </a:pPr>
             <a:r>
-              <a:t>La solicitud de beca se aprueba debido a que el estudiante cumple con el requisito de PPE y tiene deuda vencida validada.</a:t>
+              <a:t>La solicitud de beca se aprueba tras la validación de documentos por la Trabajadora Social y la existencia de deuda vencida.</a:t>
             </a:r>
           </a:p>
         </p:txBody>
@@ -5366,7 +5366,7 @@
         </p:nvSpPr>
         <p:spPr>
           <a:xfrm>
-            <a:off x="8549640" y="5486400"/>
+            <a:off x="8549640" y="6035040"/>
             <a:ext cx="3200400" cy="457200"/>
           </a:xfrm>
           <a:prstGeom prst="roundRect">
@@ -5655,7 +5655,7 @@
           <a:p/>
           <a:p>
             <a:pPr algn="l">
-              <a:defRPr sz="1000" b="0">
+              <a:defRPr sz="1200" b="0">
                 <a:solidFill>
                   <a:srgbClr val="FFFFFF"/>
                 </a:solidFill>
@@ -5666,7 +5666,7 @@
             </a:r>
             <a:br/>
             <a:r>
-              <a:t> </a:t>
+              <a:t> El estudiante solicita una beca porque presenta una situación de deuda y ha sido evaluado positivamente.</a:t>
             </a:r>
           </a:p>
         </p:txBody>
@@ -5716,7 +5716,7 @@
         <p:spPr>
           <a:xfrm>
             <a:off x="91440" y="1828800"/>
-            <a:ext cx="3657600" cy="4572000"/>
+            <a:ext cx="3657600" cy="4846320"/>
           </a:xfrm>
           <a:prstGeom prst="roundRect">
             <a:avLst/>
@@ -5971,7 +5971,7 @@
         </p:nvSpPr>
         <p:spPr>
           <a:xfrm>
-            <a:off x="320040" y="5486400"/>
+            <a:off x="320040" y="6035040"/>
             <a:ext cx="3200400" cy="457200"/>
           </a:xfrm>
           <a:prstGeom prst="roundRect">
@@ -6026,7 +6026,7 @@
         <p:spPr>
           <a:xfrm>
             <a:off x="4206240" y="1828800"/>
-            <a:ext cx="3657600" cy="4572000"/>
+            <a:ext cx="3657600" cy="4846320"/>
           </a:xfrm>
           <a:prstGeom prst="roundRect">
             <a:avLst/>
@@ -6281,7 +6281,7 @@
         </p:nvSpPr>
         <p:spPr>
           <a:xfrm>
-            <a:off x="4434840" y="5486400"/>
+            <a:off x="4434840" y="6035040"/>
             <a:ext cx="3200400" cy="457200"/>
           </a:xfrm>
           <a:prstGeom prst="roundRect">
@@ -6336,7 +6336,7 @@
         <p:spPr>
           <a:xfrm>
             <a:off x="8321040" y="1828800"/>
-            <a:ext cx="3657600" cy="4572000"/>
+            <a:ext cx="3657600" cy="4846320"/>
           </a:xfrm>
           <a:prstGeom prst="roundRect">
             <a:avLst/>
@@ -6459,6 +6459,9 @@
             <a:pPr>
               <a:defRPr sz="1200"/>
             </a:pPr>
+            <a:r>
+              <a:t>La solicitud de beca se aprueba debido a que los documentos han sido validados por una Trabajadora Social y el estudiante tiene una deuda vencida mayor que 0.</a:t>
+            </a:r>
           </a:p>
         </p:txBody>
       </p:sp>
@@ -6532,7 +6535,7 @@
         </p:nvSpPr>
         <p:spPr>
           <a:xfrm>
-            <a:off x="8549640" y="5486400"/>
+            <a:off x="8549640" y="6035040"/>
             <a:ext cx="3200400" cy="457200"/>
           </a:xfrm>
           <a:prstGeom prst="roundRect">
@@ -6821,7 +6824,7 @@
           <a:p/>
           <a:p>
             <a:pPr algn="l">
-              <a:defRPr sz="1000" b="0">
+              <a:defRPr sz="1200" b="0">
                 <a:solidFill>
                   <a:srgbClr val="FFFFFF"/>
                 </a:solidFill>
@@ -6882,7 +6885,7 @@
         <p:spPr>
           <a:xfrm>
             <a:off x="91440" y="1828800"/>
-            <a:ext cx="3657600" cy="4572000"/>
+            <a:ext cx="3657600" cy="4846320"/>
           </a:xfrm>
           <a:prstGeom prst="roundRect">
             <a:avLst/>
@@ -7129,7 +7132,7 @@
         </p:nvSpPr>
         <p:spPr>
           <a:xfrm>
-            <a:off x="320040" y="5486400"/>
+            <a:off x="320040" y="6035040"/>
             <a:ext cx="3200400" cy="457200"/>
           </a:xfrm>
           <a:prstGeom prst="roundRect">
@@ -7184,7 +7187,7 @@
         <p:spPr>
           <a:xfrm>
             <a:off x="4206240" y="1828800"/>
-            <a:ext cx="3657600" cy="4572000"/>
+            <a:ext cx="3657600" cy="4846320"/>
           </a:xfrm>
           <a:prstGeom prst="roundRect">
             <a:avLst/>
@@ -7439,7 +7442,7 @@
         </p:nvSpPr>
         <p:spPr>
           <a:xfrm>
-            <a:off x="4434840" y="5486400"/>
+            <a:off x="4434840" y="6035040"/>
             <a:ext cx="3200400" cy="457200"/>
           </a:xfrm>
           <a:prstGeom prst="roundRect">
@@ -7494,7 +7497,7 @@
         <p:spPr>
           <a:xfrm>
             <a:off x="8321040" y="1828800"/>
-            <a:ext cx="3657600" cy="4572000"/>
+            <a:ext cx="3657600" cy="4846320"/>
           </a:xfrm>
           <a:prstGeom prst="roundRect">
             <a:avLst/>
@@ -7618,7 +7621,7 @@
               <a:defRPr sz="1200"/>
             </a:pPr>
             <a:r>
-              <a:t>La solicitud de beca se rechaza porque no hay deuda a cubrir.</a:t>
+              <a:t>La solicitud de beca se rechaza porque el estudiante no tiene deuda a cubrir.</a:t>
             </a:r>
           </a:p>
         </p:txBody>
@@ -7693,7 +7696,7 @@
         </p:nvSpPr>
         <p:spPr>
           <a:xfrm>
-            <a:off x="8549640" y="5486400"/>
+            <a:off x="8549640" y="6035040"/>
             <a:ext cx="3200400" cy="457200"/>
           </a:xfrm>
           <a:prstGeom prst="roundRect">
@@ -7982,7 +7985,7 @@
           <a:p/>
           <a:p>
             <a:pPr algn="l">
-              <a:defRPr sz="1000" b="0">
+              <a:defRPr sz="1200" b="0">
                 <a:solidFill>
                   <a:srgbClr val="FFFFFF"/>
                 </a:solidFill>
@@ -7993,7 +7996,7 @@
             </a:r>
             <a:br/>
             <a:r>
-              <a:t> El estudiante no tiene deuda vencida en el sistema.</a:t>
+              <a:t> El estudiante no tiene deuda a cubrir.</a:t>
             </a:r>
           </a:p>
         </p:txBody>
@@ -8043,7 +8046,7 @@
         <p:spPr>
           <a:xfrm>
             <a:off x="91440" y="1828800"/>
-            <a:ext cx="3657600" cy="4572000"/>
+            <a:ext cx="3657600" cy="4846320"/>
           </a:xfrm>
           <a:prstGeom prst="roundRect">
             <a:avLst/>
@@ -8263,7 +8266,7 @@
         </p:nvSpPr>
         <p:spPr>
           <a:xfrm>
-            <a:off x="320040" y="5486400"/>
+            <a:off x="320040" y="6035040"/>
             <a:ext cx="3200400" cy="457200"/>
           </a:xfrm>
           <a:prstGeom prst="roundRect">
@@ -8318,7 +8321,7 @@
         <p:spPr>
           <a:xfrm>
             <a:off x="4206240" y="1828800"/>
-            <a:ext cx="3657600" cy="4572000"/>
+            <a:ext cx="3657600" cy="4846320"/>
           </a:xfrm>
           <a:prstGeom prst="roundRect">
             <a:avLst/>
@@ -8573,7 +8576,7 @@
         </p:nvSpPr>
         <p:spPr>
           <a:xfrm>
-            <a:off x="4434840" y="5486400"/>
+            <a:off x="4434840" y="6035040"/>
             <a:ext cx="3200400" cy="457200"/>
           </a:xfrm>
           <a:prstGeom prst="roundRect">
@@ -8628,7 +8631,7 @@
         <p:spPr>
           <a:xfrm>
             <a:off x="8321040" y="1828800"/>
-            <a:ext cx="3657600" cy="4572000"/>
+            <a:ext cx="3657600" cy="4846320"/>
           </a:xfrm>
           <a:prstGeom prst="roundRect">
             <a:avLst/>
@@ -8752,7 +8755,7 @@
               <a:defRPr sz="1200"/>
             </a:pPr>
             <a:r>
-              <a:t>La solicitud de beca se rechaza porque el estudiante no tiene deuda a cubrir.</a:t>
+              <a:t>La solicitud de beca se rechaza porque el estudiante no tiene deuda vencida en el sistema.</a:t>
             </a:r>
           </a:p>
         </p:txBody>
@@ -8827,7 +8830,7 @@
         </p:nvSpPr>
         <p:spPr>
           <a:xfrm>
-            <a:off x="8549640" y="5486400"/>
+            <a:off x="8549640" y="6035040"/>
             <a:ext cx="3200400" cy="457200"/>
           </a:xfrm>
           <a:prstGeom prst="roundRect">
@@ -9116,7 +9119,7 @@
           <a:p/>
           <a:p>
             <a:pPr algn="l">
-              <a:defRPr sz="1000" b="0">
+              <a:defRPr sz="1200" b="0">
                 <a:solidFill>
                   <a:srgbClr val="FFFFFF"/>
                 </a:solidFill>
@@ -9127,7 +9130,7 @@
             </a:r>
             <a:br/>
             <a:r>
-              <a:t> El estudiante no tiene deuda a cubrir y, por lo tanto, no puede optar a la beca.</a:t>
+              <a:t> El estudiante no cumple con el requisito de tener deuda vencida.</a:t>
             </a:r>
           </a:p>
         </p:txBody>
@@ -9177,7 +9180,7 @@
         <p:spPr>
           <a:xfrm>
             <a:off x="91440" y="1828800"/>
-            <a:ext cx="3657600" cy="4572000"/>
+            <a:ext cx="3657600" cy="4846320"/>
           </a:xfrm>
           <a:prstGeom prst="roundRect">
             <a:avLst/>
@@ -9416,7 +9419,7 @@
         </p:nvSpPr>
         <p:spPr>
           <a:xfrm>
-            <a:off x="320040" y="5486400"/>
+            <a:off x="320040" y="6035040"/>
             <a:ext cx="3200400" cy="457200"/>
           </a:xfrm>
           <a:prstGeom prst="roundRect">
@@ -9471,7 +9474,7 @@
         <p:spPr>
           <a:xfrm>
             <a:off x="4206240" y="1828800"/>
-            <a:ext cx="3657600" cy="4572000"/>
+            <a:ext cx="3657600" cy="4846320"/>
           </a:xfrm>
           <a:prstGeom prst="roundRect">
             <a:avLst/>
@@ -9726,7 +9729,7 @@
         </p:nvSpPr>
         <p:spPr>
           <a:xfrm>
-            <a:off x="4434840" y="5486400"/>
+            <a:off x="4434840" y="6035040"/>
             <a:ext cx="3200400" cy="457200"/>
           </a:xfrm>
           <a:prstGeom prst="roundRect">
@@ -9781,7 +9784,7 @@
         <p:spPr>
           <a:xfrm>
             <a:off x="8321040" y="1828800"/>
-            <a:ext cx="3657600" cy="4572000"/>
+            <a:ext cx="3657600" cy="4846320"/>
           </a:xfrm>
           <a:prstGeom prst="roundRect">
             <a:avLst/>
@@ -9905,7 +9908,7 @@
               <a:defRPr sz="1200"/>
             </a:pPr>
             <a:r>
-              <a:t>La solicitud de beca se rechaza porque el estudiante no tiene deuda vencida en el sistema.</a:t>
+              <a:t>La solicitud de beca se rechaza porque el estudiante no tiene deuda vencida a cubrir.</a:t>
             </a:r>
           </a:p>
         </p:txBody>
@@ -9980,7 +9983,7 @@
         </p:nvSpPr>
         <p:spPr>
           <a:xfrm>
-            <a:off x="8549640" y="5486400"/>
+            <a:off x="8549640" y="6035040"/>
             <a:ext cx="3200400" cy="457200"/>
           </a:xfrm>
           <a:prstGeom prst="roundRect">
@@ -10269,7 +10272,7 @@
           <a:p/>
           <a:p>
             <a:pPr algn="l">
-              <a:defRPr sz="1000" b="0">
+              <a:defRPr sz="1200" b="0">
                 <a:solidFill>
                   <a:srgbClr val="FFFFFF"/>
                 </a:solidFill>
@@ -10330,7 +10333,7 @@
         <p:spPr>
           <a:xfrm>
             <a:off x="91440" y="1828800"/>
-            <a:ext cx="3657600" cy="4572000"/>
+            <a:ext cx="3657600" cy="4846320"/>
           </a:xfrm>
           <a:prstGeom prst="roundRect">
             <a:avLst/>
@@ -10577,7 +10580,7 @@
         </p:nvSpPr>
         <p:spPr>
           <a:xfrm>
-            <a:off x="320040" y="5486400"/>
+            <a:off x="320040" y="6035040"/>
             <a:ext cx="3200400" cy="457200"/>
           </a:xfrm>
           <a:prstGeom prst="roundRect">
@@ -10632,7 +10635,7 @@
         <p:spPr>
           <a:xfrm>
             <a:off x="4206240" y="1828800"/>
-            <a:ext cx="3657600" cy="4572000"/>
+            <a:ext cx="3657600" cy="4846320"/>
           </a:xfrm>
           <a:prstGeom prst="roundRect">
             <a:avLst/>
@@ -10887,7 +10890,7 @@
         </p:nvSpPr>
         <p:spPr>
           <a:xfrm>
-            <a:off x="4434840" y="5486400"/>
+            <a:off x="4434840" y="6035040"/>
             <a:ext cx="3200400" cy="457200"/>
           </a:xfrm>
           <a:prstGeom prst="roundRect">
@@ -10942,7 +10945,7 @@
         <p:spPr>
           <a:xfrm>
             <a:off x="8321040" y="1828800"/>
-            <a:ext cx="3657600" cy="4572000"/>
+            <a:ext cx="3657600" cy="4846320"/>
           </a:xfrm>
           <a:prstGeom prst="roundRect">
             <a:avLst/>
@@ -11066,7 +11069,7 @@
               <a:defRPr sz="1200"/>
             </a:pPr>
             <a:r>
-              <a:t>La solicitud de beca se rechaza porque el estudiante no cumple con el requisito mínimo de PPE.</a:t>
+              <a:t>La solicitud de beca se rechaza porque el PPE es menor a 0.5.</a:t>
             </a:r>
           </a:p>
         </p:txBody>
@@ -11141,7 +11144,7 @@
         </p:nvSpPr>
         <p:spPr>
           <a:xfrm>
-            <a:off x="8549640" y="5486400"/>
+            <a:off x="8549640" y="6035040"/>
             <a:ext cx="3200400" cy="457200"/>
           </a:xfrm>
           <a:prstGeom prst="roundRect">
@@ -11430,7 +11433,7 @@
           <a:p/>
           <a:p>
             <a:pPr algn="l">
-              <a:defRPr sz="1000" b="0">
+              <a:defRPr sz="1200" b="0">
                 <a:solidFill>
                   <a:srgbClr val="FFFFFF"/>
                 </a:solidFill>
@@ -11491,7 +11494,7 @@
         <p:spPr>
           <a:xfrm>
             <a:off x="91440" y="1828800"/>
-            <a:ext cx="3657600" cy="4572000"/>
+            <a:ext cx="3657600" cy="4846320"/>
           </a:xfrm>
           <a:prstGeom prst="roundRect">
             <a:avLst/>
@@ -11738,7 +11741,7 @@
         </p:nvSpPr>
         <p:spPr>
           <a:xfrm>
-            <a:off x="320040" y="5486400"/>
+            <a:off x="320040" y="6035040"/>
             <a:ext cx="3200400" cy="457200"/>
           </a:xfrm>
           <a:prstGeom prst="roundRect">
@@ -11793,7 +11796,7 @@
         <p:spPr>
           <a:xfrm>
             <a:off x="4206240" y="1828800"/>
-            <a:ext cx="3657600" cy="4572000"/>
+            <a:ext cx="3657600" cy="4846320"/>
           </a:xfrm>
           <a:prstGeom prst="roundRect">
             <a:avLst/>
@@ -12048,7 +12051,7 @@
         </p:nvSpPr>
         <p:spPr>
           <a:xfrm>
-            <a:off x="4434840" y="5486400"/>
+            <a:off x="4434840" y="6035040"/>
             <a:ext cx="3200400" cy="457200"/>
           </a:xfrm>
           <a:prstGeom prst="roundRect">
@@ -12103,7 +12106,7 @@
         <p:spPr>
           <a:xfrm>
             <a:off x="8321040" y="1828800"/>
-            <a:ext cx="3657600" cy="4572000"/>
+            <a:ext cx="3657600" cy="4846320"/>
           </a:xfrm>
           <a:prstGeom prst="roundRect">
             <a:avLst/>
@@ -12302,7 +12305,7 @@
         </p:nvSpPr>
         <p:spPr>
           <a:xfrm>
-            <a:off x="8549640" y="5486400"/>
+            <a:off x="8549640" y="6035040"/>
             <a:ext cx="3200400" cy="457200"/>
           </a:xfrm>
           <a:prstGeom prst="roundRect">
@@ -12591,7 +12594,7 @@
           <a:p/>
           <a:p>
             <a:pPr algn="l">
-              <a:defRPr sz="1000" b="0">
+              <a:defRPr sz="1200" b="0">
                 <a:solidFill>
                   <a:srgbClr val="FFFFFF"/>
                 </a:solidFill>
@@ -12602,7 +12605,7 @@
             </a:r>
             <a:br/>
             <a:r>
-              <a:t> La Trabajadora Social sugiere rechazar la solicitud debido a la situación económica familiar.</a:t>
+              <a:t> El estudiante se encuentra en una situación económica desafiante, pero se sugiere rechazar la solicitud por recomendación de la Trabajadora Social.</a:t>
             </a:r>
           </a:p>
         </p:txBody>
@@ -12652,7 +12655,7 @@
         <p:spPr>
           <a:xfrm>
             <a:off x="91440" y="1828800"/>
-            <a:ext cx="3657600" cy="4572000"/>
+            <a:ext cx="3657600" cy="4846320"/>
           </a:xfrm>
           <a:prstGeom prst="roundRect">
             <a:avLst/>
@@ -12891,7 +12894,7 @@
         </p:nvSpPr>
         <p:spPr>
           <a:xfrm>
-            <a:off x="320040" y="5486400"/>
+            <a:off x="320040" y="6035040"/>
             <a:ext cx="3200400" cy="457200"/>
           </a:xfrm>
           <a:prstGeom prst="roundRect">
@@ -12946,7 +12949,7 @@
         <p:spPr>
           <a:xfrm>
             <a:off x="4206240" y="1828800"/>
-            <a:ext cx="3657600" cy="4572000"/>
+            <a:ext cx="3657600" cy="4846320"/>
           </a:xfrm>
           <a:prstGeom prst="roundRect">
             <a:avLst/>
@@ -13201,7 +13204,7 @@
         </p:nvSpPr>
         <p:spPr>
           <a:xfrm>
-            <a:off x="4434840" y="5486400"/>
+            <a:off x="4434840" y="6035040"/>
             <a:ext cx="3200400" cy="457200"/>
           </a:xfrm>
           <a:prstGeom prst="roundRect">
@@ -13256,7 +13259,7 @@
         <p:spPr>
           <a:xfrm>
             <a:off x="8321040" y="1828800"/>
-            <a:ext cx="3657600" cy="4572000"/>
+            <a:ext cx="3657600" cy="4846320"/>
           </a:xfrm>
           <a:prstGeom prst="roundRect">
             <a:avLst/>
@@ -13380,7 +13383,7 @@
               <a:defRPr sz="1200"/>
             </a:pPr>
             <a:r>
-              <a:t>La solicitud de beca se rechaza porque se sugiere rechazar la solicitud de la Trabajadora Social.</a:t>
+              <a:t>La solicitud de beca se rechaza porque, a pesar de que el PPE es mayor a 0.5, la Trabajadora Social sugiere rechazar la solicitud debido a la situación económica familiar.</a:t>
             </a:r>
           </a:p>
         </p:txBody>
@@ -13455,7 +13458,7 @@
         </p:nvSpPr>
         <p:spPr>
           <a:xfrm>
-            <a:off x="8549640" y="5486400"/>
+            <a:off x="8549640" y="6035040"/>
             <a:ext cx="3200400" cy="457200"/>
           </a:xfrm>
           <a:prstGeom prst="roundRect">
@@ -13744,7 +13747,7 @@
           <a:p/>
           <a:p>
             <a:pPr algn="l">
-              <a:defRPr sz="1000" b="0">
+              <a:defRPr sz="1200" b="0">
                 <a:solidFill>
                   <a:srgbClr val="FFFFFF"/>
                 </a:solidFill>
@@ -13755,7 +13758,7 @@
             </a:r>
             <a:br/>
             <a:r>
-              <a:t> El estudiante no tiene deuda a cubrir, por lo que no se aprueba la solicitud de beca.</a:t>
+              <a:t> El estudiante tiene deuda vencida de 0.0 en el sistema, lo que impide la aprobación de la beca.</a:t>
             </a:r>
           </a:p>
         </p:txBody>
@@ -13805,7 +13808,7 @@
         <p:spPr>
           <a:xfrm>
             <a:off x="91440" y="1828800"/>
-            <a:ext cx="3657600" cy="4572000"/>
+            <a:ext cx="3657600" cy="4846320"/>
           </a:xfrm>
           <a:prstGeom prst="roundRect">
             <a:avLst/>
@@ -14036,7 +14039,7 @@
         </p:nvSpPr>
         <p:spPr>
           <a:xfrm>
-            <a:off x="320040" y="5486400"/>
+            <a:off x="320040" y="6035040"/>
             <a:ext cx="3200400" cy="457200"/>
           </a:xfrm>
           <a:prstGeom prst="roundRect">
@@ -14091,7 +14094,7 @@
         <p:spPr>
           <a:xfrm>
             <a:off x="4206240" y="1828800"/>
-            <a:ext cx="3657600" cy="4572000"/>
+            <a:ext cx="3657600" cy="4846320"/>
           </a:xfrm>
           <a:prstGeom prst="roundRect">
             <a:avLst/>
@@ -14346,7 +14349,7 @@
         </p:nvSpPr>
         <p:spPr>
           <a:xfrm>
-            <a:off x="4434840" y="5486400"/>
+            <a:off x="4434840" y="6035040"/>
             <a:ext cx="3200400" cy="457200"/>
           </a:xfrm>
           <a:prstGeom prst="roundRect">
@@ -14401,7 +14404,7 @@
         <p:spPr>
           <a:xfrm>
             <a:off x="8321040" y="1828800"/>
-            <a:ext cx="3657600" cy="4572000"/>
+            <a:ext cx="3657600" cy="4846320"/>
           </a:xfrm>
           <a:prstGeom prst="roundRect">
             <a:avLst/>
@@ -14525,7 +14528,7 @@
               <a:defRPr sz="1200"/>
             </a:pPr>
             <a:r>
-              <a:t>La solicitud de beca se rechaza porque la deuda vencida en el sistema es 0.</a:t>
+              <a:t>La solicitud de beca se rechaza porque no hay deuda a cubrir.</a:t>
             </a:r>
           </a:p>
         </p:txBody>
@@ -14600,7 +14603,7 @@
         </p:nvSpPr>
         <p:spPr>
           <a:xfrm>
-            <a:off x="8549640" y="5486400"/>
+            <a:off x="8549640" y="6035040"/>
             <a:ext cx="3200400" cy="457200"/>
           </a:xfrm>
           <a:prstGeom prst="roundRect">
@@ -14889,7 +14892,7 @@
           <a:p/>
           <a:p>
             <a:pPr algn="l">
-              <a:defRPr sz="1000" b="0">
+              <a:defRPr sz="1200" b="0">
                 <a:solidFill>
                   <a:srgbClr val="FFFFFF"/>
                 </a:solidFill>
@@ -14950,7 +14953,7 @@
         <p:spPr>
           <a:xfrm>
             <a:off x="91440" y="1828800"/>
-            <a:ext cx="3657600" cy="4572000"/>
+            <a:ext cx="3657600" cy="4846320"/>
           </a:xfrm>
           <a:prstGeom prst="roundRect">
             <a:avLst/>
@@ -15189,7 +15192,7 @@
         </p:nvSpPr>
         <p:spPr>
           <a:xfrm>
-            <a:off x="320040" y="5486400"/>
+            <a:off x="320040" y="6035040"/>
             <a:ext cx="3200400" cy="457200"/>
           </a:xfrm>
           <a:prstGeom prst="roundRect">
@@ -15244,7 +15247,7 @@
         <p:spPr>
           <a:xfrm>
             <a:off x="4206240" y="1828800"/>
-            <a:ext cx="3657600" cy="4572000"/>
+            <a:ext cx="3657600" cy="4846320"/>
           </a:xfrm>
           <a:prstGeom prst="roundRect">
             <a:avLst/>
@@ -15499,7 +15502,7 @@
         </p:nvSpPr>
         <p:spPr>
           <a:xfrm>
-            <a:off x="4434840" y="5486400"/>
+            <a:off x="4434840" y="6035040"/>
             <a:ext cx="3200400" cy="457200"/>
           </a:xfrm>
           <a:prstGeom prst="roundRect">
@@ -15554,7 +15557,7 @@
         <p:spPr>
           <a:xfrm>
             <a:off x="8321040" y="1828800"/>
-            <a:ext cx="3657600" cy="4572000"/>
+            <a:ext cx="3657600" cy="4846320"/>
           </a:xfrm>
           <a:prstGeom prst="roundRect">
             <a:avLst/>
@@ -15678,7 +15681,7 @@
               <a:defRPr sz="1200"/>
             </a:pPr>
             <a:r>
-              <a:t>La solicitud de beca se rechaza porque el PPE es menor al requisito mínimo.</a:t>
+              <a:t>La solicitud de beca se rechaza porque el estudiante no cumple con el requisito mínimo de PPE.</a:t>
             </a:r>
           </a:p>
         </p:txBody>
@@ -15753,7 +15756,7 @@
         </p:nvSpPr>
         <p:spPr>
           <a:xfrm>
-            <a:off x="8549640" y="5486400"/>
+            <a:off x="8549640" y="6035040"/>
             <a:ext cx="3200400" cy="457200"/>
           </a:xfrm>
           <a:prstGeom prst="roundRect">
@@ -16042,7 +16045,7 @@
           <a:p/>
           <a:p>
             <a:pPr algn="l">
-              <a:defRPr sz="1000" b="0">
+              <a:defRPr sz="1200" b="0">
                 <a:solidFill>
                   <a:srgbClr val="FFFFFF"/>
                 </a:solidFill>
@@ -16053,7 +16056,7 @@
             </a:r>
             <a:br/>
             <a:r>
-              <a:t> El estudiante solicita una beca para cubrir su deuda vencida y ha sido ayudado por la Trabajadora Social quien considera su situación económica.</a:t>
+              <a:t> El estudiante solicita una beca porque su situación económica actual es complicada, con ingresos insuficientes en su familia.</a:t>
             </a:r>
           </a:p>
         </p:txBody>
@@ -16103,7 +16106,7 @@
         <p:spPr>
           <a:xfrm>
             <a:off x="91440" y="1828800"/>
-            <a:ext cx="3657600" cy="4572000"/>
+            <a:ext cx="3657600" cy="4846320"/>
           </a:xfrm>
           <a:prstGeom prst="roundRect">
             <a:avLst/>
@@ -16342,7 +16345,7 @@
         </p:nvSpPr>
         <p:spPr>
           <a:xfrm>
-            <a:off x="320040" y="5486400"/>
+            <a:off x="320040" y="6035040"/>
             <a:ext cx="3200400" cy="457200"/>
           </a:xfrm>
           <a:prstGeom prst="roundRect">
@@ -16397,7 +16400,7 @@
         <p:spPr>
           <a:xfrm>
             <a:off x="4206240" y="1828800"/>
-            <a:ext cx="3657600" cy="4572000"/>
+            <a:ext cx="3657600" cy="4846320"/>
           </a:xfrm>
           <a:prstGeom prst="roundRect">
             <a:avLst/>
@@ -16652,7 +16655,7 @@
         </p:nvSpPr>
         <p:spPr>
           <a:xfrm>
-            <a:off x="4434840" y="5486400"/>
+            <a:off x="4434840" y="6035040"/>
             <a:ext cx="3200400" cy="457200"/>
           </a:xfrm>
           <a:prstGeom prst="roundRect">
@@ -16707,7 +16710,7 @@
         <p:spPr>
           <a:xfrm>
             <a:off x="8321040" y="1828800"/>
-            <a:ext cx="3657600" cy="4572000"/>
+            <a:ext cx="3657600" cy="4846320"/>
           </a:xfrm>
           <a:prstGeom prst="roundRect">
             <a:avLst/>
@@ -16831,7 +16834,7 @@
               <a:defRPr sz="1200"/>
             </a:pPr>
             <a:r>
-              <a:t>La solicitud de beca se aprueba con una deuda vencida de 581385.0.</a:t>
+              <a:t>La solicitud de beca se aprueba porque los documentos han sido validados por la Trabajadora Social y el estudiante tiene una deuda vencida mayor que 0.</a:t>
             </a:r>
           </a:p>
         </p:txBody>
@@ -16906,7 +16909,7 @@
         </p:nvSpPr>
         <p:spPr>
           <a:xfrm>
-            <a:off x="8549640" y="5486400"/>
+            <a:off x="8549640" y="6035040"/>
             <a:ext cx="3200400" cy="457200"/>
           </a:xfrm>
           <a:prstGeom prst="roundRect">
@@ -17195,7 +17198,7 @@
           <a:p/>
           <a:p>
             <a:pPr algn="l">
-              <a:defRPr sz="1000" b="0">
+              <a:defRPr sz="1200" b="0">
                 <a:solidFill>
                   <a:srgbClr val="FFFFFF"/>
                 </a:solidFill>
@@ -17206,7 +17209,7 @@
             </a:r>
             <a:br/>
             <a:r>
-              <a:t> El estudiante solicita una beca 1 arancel y tiene una deuda vencida.</a:t>
+              <a:t> El estudiante solicita una beca para ayudar a cubrir la deuda vencida registrada en el sistema.</a:t>
             </a:r>
           </a:p>
         </p:txBody>
@@ -17256,7 +17259,7 @@
         <p:spPr>
           <a:xfrm>
             <a:off x="91440" y="1828800"/>
-            <a:ext cx="3657600" cy="4572000"/>
+            <a:ext cx="3657600" cy="4846320"/>
           </a:xfrm>
           <a:prstGeom prst="roundRect">
             <a:avLst/>
@@ -17503,7 +17506,7 @@
         </p:nvSpPr>
         <p:spPr>
           <a:xfrm>
-            <a:off x="320040" y="5486400"/>
+            <a:off x="320040" y="6035040"/>
             <a:ext cx="3200400" cy="457200"/>
           </a:xfrm>
           <a:prstGeom prst="roundRect">
@@ -17558,7 +17561,7 @@
         <p:spPr>
           <a:xfrm>
             <a:off x="4206240" y="1828800"/>
-            <a:ext cx="3657600" cy="4572000"/>
+            <a:ext cx="3657600" cy="4846320"/>
           </a:xfrm>
           <a:prstGeom prst="roundRect">
             <a:avLst/>
@@ -17813,7 +17816,7 @@
         </p:nvSpPr>
         <p:spPr>
           <a:xfrm>
-            <a:off x="4434840" y="5486400"/>
+            <a:off x="4434840" y="6035040"/>
             <a:ext cx="3200400" cy="457200"/>
           </a:xfrm>
           <a:prstGeom prst="roundRect">
@@ -17868,7 +17871,7 @@
         <p:spPr>
           <a:xfrm>
             <a:off x="8321040" y="1828800"/>
-            <a:ext cx="3657600" cy="4572000"/>
+            <a:ext cx="3657600" cy="4846320"/>
           </a:xfrm>
           <a:prstGeom prst="roundRect">
             <a:avLst/>
@@ -17992,7 +17995,7 @@
               <a:defRPr sz="1200"/>
             </a:pPr>
             <a:r>
-              <a:t>La solicitud de beca se aprueba con base en la validación de documentos y la deuda vencida.</a:t>
+              <a:t>La solicitud de beca se aprueba debido a que los documentos han sido validados por una Trabajadora Social y el estudiante tiene una deuda vencida mayor que 0.</a:t>
             </a:r>
           </a:p>
         </p:txBody>
@@ -18067,7 +18070,7 @@
         </p:nvSpPr>
         <p:spPr>
           <a:xfrm>
-            <a:off x="8549640" y="5486400"/>
+            <a:off x="8549640" y="6035040"/>
             <a:ext cx="3200400" cy="457200"/>
           </a:xfrm>
           <a:prstGeom prst="roundRect">
@@ -18356,7 +18359,7 @@
           <a:p/>
           <a:p>
             <a:pPr algn="l">
-              <a:defRPr sz="1000" b="0">
+              <a:defRPr sz="1200" b="0">
                 <a:solidFill>
                   <a:srgbClr val="FFFFFF"/>
                 </a:solidFill>
@@ -18417,7 +18420,7 @@
         <p:spPr>
           <a:xfrm>
             <a:off x="91440" y="1828800"/>
-            <a:ext cx="3657600" cy="4572000"/>
+            <a:ext cx="3657600" cy="4846320"/>
           </a:xfrm>
           <a:prstGeom prst="roundRect">
             <a:avLst/>
@@ -18664,7 +18667,7 @@
         </p:nvSpPr>
         <p:spPr>
           <a:xfrm>
-            <a:off x="320040" y="5486400"/>
+            <a:off x="320040" y="6035040"/>
             <a:ext cx="3200400" cy="457200"/>
           </a:xfrm>
           <a:prstGeom prst="roundRect">
@@ -18719,7 +18722,7 @@
         <p:spPr>
           <a:xfrm>
             <a:off x="4206240" y="1828800"/>
-            <a:ext cx="3657600" cy="4572000"/>
+            <a:ext cx="3657600" cy="4846320"/>
           </a:xfrm>
           <a:prstGeom prst="roundRect">
             <a:avLst/>
@@ -18974,7 +18977,7 @@
         </p:nvSpPr>
         <p:spPr>
           <a:xfrm>
-            <a:off x="4434840" y="5486400"/>
+            <a:off x="4434840" y="6035040"/>
             <a:ext cx="3200400" cy="457200"/>
           </a:xfrm>
           <a:prstGeom prst="roundRect">
@@ -19029,7 +19032,7 @@
         <p:spPr>
           <a:xfrm>
             <a:off x="8321040" y="1828800"/>
-            <a:ext cx="3657600" cy="4572000"/>
+            <a:ext cx="3657600" cy="4846320"/>
           </a:xfrm>
           <a:prstGeom prst="roundRect">
             <a:avLst/>
@@ -19153,7 +19156,7 @@
               <a:defRPr sz="1200"/>
             </a:pPr>
             <a:r>
-              <a:t>La solicitud de beca se rechaza porque el PPE del estudiante es menor a 0.5.</a:t>
+              <a:t>La solicitud de beca se rechaza porque el PPE es menor a 0.5.</a:t>
             </a:r>
           </a:p>
         </p:txBody>
@@ -19228,7 +19231,7 @@
         </p:nvSpPr>
         <p:spPr>
           <a:xfrm>
-            <a:off x="8549640" y="5486400"/>
+            <a:off x="8549640" y="6035040"/>
             <a:ext cx="3200400" cy="457200"/>
           </a:xfrm>
           <a:prstGeom prst="roundRect">
@@ -19517,7 +19520,7 @@
           <a:p/>
           <a:p>
             <a:pPr algn="l">
-              <a:defRPr sz="1000" b="0">
+              <a:defRPr sz="1200" b="0">
                 <a:solidFill>
                   <a:srgbClr val="FFFFFF"/>
                 </a:solidFill>
@@ -19578,7 +19581,7 @@
         <p:spPr>
           <a:xfrm>
             <a:off x="91440" y="1828800"/>
-            <a:ext cx="3657600" cy="4572000"/>
+            <a:ext cx="3657600" cy="4846320"/>
           </a:xfrm>
           <a:prstGeom prst="roundRect">
             <a:avLst/>
@@ -19825,7 +19828,7 @@
         </p:nvSpPr>
         <p:spPr>
           <a:xfrm>
-            <a:off x="320040" y="5486400"/>
+            <a:off x="320040" y="6035040"/>
             <a:ext cx="3200400" cy="457200"/>
           </a:xfrm>
           <a:prstGeom prst="roundRect">
@@ -19880,7 +19883,7 @@
         <p:spPr>
           <a:xfrm>
             <a:off x="4206240" y="1828800"/>
-            <a:ext cx="3657600" cy="4572000"/>
+            <a:ext cx="3657600" cy="4846320"/>
           </a:xfrm>
           <a:prstGeom prst="roundRect">
             <a:avLst/>
@@ -20135,7 +20138,7 @@
         </p:nvSpPr>
         <p:spPr>
           <a:xfrm>
-            <a:off x="4434840" y="5486400"/>
+            <a:off x="4434840" y="6035040"/>
             <a:ext cx="3200400" cy="457200"/>
           </a:xfrm>
           <a:prstGeom prst="roundRect">
@@ -20190,7 +20193,7 @@
         <p:spPr>
           <a:xfrm>
             <a:off x="8321040" y="1828800"/>
-            <a:ext cx="3657600" cy="4572000"/>
+            <a:ext cx="3657600" cy="4846320"/>
           </a:xfrm>
           <a:prstGeom prst="roundRect">
             <a:avLst/>
@@ -20314,7 +20317,7 @@
               <a:defRPr sz="1200"/>
             </a:pPr>
             <a:r>
-              <a:t>La solicitud de beca se rechaza porque el PPE es menor a 0.5.</a:t>
+              <a:t>La solicitud de beca se rechaza porque el estudiante no cumple con el requisito mínimo de PPE.</a:t>
             </a:r>
           </a:p>
         </p:txBody>
@@ -20389,7 +20392,7 @@
         </p:nvSpPr>
         <p:spPr>
           <a:xfrm>
-            <a:off x="8549640" y="5486400"/>
+            <a:off x="8549640" y="6035040"/>
             <a:ext cx="3200400" cy="457200"/>
           </a:xfrm>
           <a:prstGeom prst="roundRect">
@@ -20678,7 +20681,7 @@
           <a:p/>
           <a:p>
             <a:pPr algn="l">
-              <a:defRPr sz="1000" b="0">
+              <a:defRPr sz="1200" b="0">
                 <a:solidFill>
                   <a:srgbClr val="FFFFFF"/>
                 </a:solidFill>
@@ -20689,7 +20692,7 @@
             </a:r>
             <a:br/>
             <a:r>
-              <a:t> El estudiante solicita una beca para cubrir su deuda vencida y tiene una situación socioeconómica vulnerable.</a:t>
+              <a:t> El estudiante solicita una beca 1 arancel debido a su situación económica vulnerable y la validación de documentos por parte de Trabajadora Social.</a:t>
             </a:r>
           </a:p>
         </p:txBody>
@@ -20739,7 +20742,7 @@
         <p:spPr>
           <a:xfrm>
             <a:off x="91440" y="1828800"/>
-            <a:ext cx="3657600" cy="4572000"/>
+            <a:ext cx="3657600" cy="4846320"/>
           </a:xfrm>
           <a:prstGeom prst="roundRect">
             <a:avLst/>
@@ -20978,7 +20981,7 @@
         </p:nvSpPr>
         <p:spPr>
           <a:xfrm>
-            <a:off x="320040" y="5486400"/>
+            <a:off x="320040" y="6035040"/>
             <a:ext cx="3200400" cy="457200"/>
           </a:xfrm>
           <a:prstGeom prst="roundRect">
@@ -21033,7 +21036,7 @@
         <p:spPr>
           <a:xfrm>
             <a:off x="4206240" y="1828800"/>
-            <a:ext cx="3657600" cy="4572000"/>
+            <a:ext cx="3657600" cy="4846320"/>
           </a:xfrm>
           <a:prstGeom prst="roundRect">
             <a:avLst/>
@@ -21288,7 +21291,7 @@
         </p:nvSpPr>
         <p:spPr>
           <a:xfrm>
-            <a:off x="4434840" y="5486400"/>
+            <a:off x="4434840" y="6035040"/>
             <a:ext cx="3200400" cy="457200"/>
           </a:xfrm>
           <a:prstGeom prst="roundRect">
@@ -21343,7 +21346,7 @@
         <p:spPr>
           <a:xfrm>
             <a:off x="8321040" y="1828800"/>
-            <a:ext cx="3657600" cy="4572000"/>
+            <a:ext cx="3657600" cy="4846320"/>
           </a:xfrm>
           <a:prstGeom prst="roundRect">
             <a:avLst/>
@@ -21467,7 +21470,7 @@
               <a:defRPr sz="1200"/>
             </a:pPr>
             <a:r>
-              <a:t>La solicitud de beca se aprueba debido a que los documentos han sido validados por una Trabajadora Social y el estudiante tiene una deuda vencida mayor que 0.</a:t>
+              <a:t>La solicitud de beca se aprueba debido a que el estudiante cumple con los requisitos establecidos y presenta una deuda vencida superior a 0.</a:t>
             </a:r>
           </a:p>
         </p:txBody>
@@ -21542,7 +21545,7 @@
         </p:nvSpPr>
         <p:spPr>
           <a:xfrm>
-            <a:off x="8549640" y="5486400"/>
+            <a:off x="8549640" y="6035040"/>
             <a:ext cx="3200400" cy="457200"/>
           </a:xfrm>
           <a:prstGeom prst="roundRect">
@@ -21831,7 +21834,7 @@
           <a:p/>
           <a:p>
             <a:pPr algn="l">
-              <a:defRPr sz="1000" b="0">
+              <a:defRPr sz="1200" b="0">
                 <a:solidFill>
                   <a:srgbClr val="FFFFFF"/>
                 </a:solidFill>
@@ -21892,7 +21895,7 @@
         <p:spPr>
           <a:xfrm>
             <a:off x="91440" y="1828800"/>
-            <a:ext cx="3657600" cy="4572000"/>
+            <a:ext cx="3657600" cy="4846320"/>
           </a:xfrm>
           <a:prstGeom prst="roundRect">
             <a:avLst/>
@@ -22147,7 +22150,7 @@
         </p:nvSpPr>
         <p:spPr>
           <a:xfrm>
-            <a:off x="320040" y="5486400"/>
+            <a:off x="320040" y="6035040"/>
             <a:ext cx="3200400" cy="457200"/>
           </a:xfrm>
           <a:prstGeom prst="roundRect">
@@ -22202,7 +22205,7 @@
         <p:spPr>
           <a:xfrm>
             <a:off x="4206240" y="1828800"/>
-            <a:ext cx="3657600" cy="4572000"/>
+            <a:ext cx="3657600" cy="4846320"/>
           </a:xfrm>
           <a:prstGeom prst="roundRect">
             <a:avLst/>
@@ -22457,7 +22460,7 @@
         </p:nvSpPr>
         <p:spPr>
           <a:xfrm>
-            <a:off x="4434840" y="5486400"/>
+            <a:off x="4434840" y="6035040"/>
             <a:ext cx="3200400" cy="457200"/>
           </a:xfrm>
           <a:prstGeom prst="roundRect">
@@ -22512,7 +22515,7 @@
         <p:spPr>
           <a:xfrm>
             <a:off x="8321040" y="1828800"/>
-            <a:ext cx="3657600" cy="4572000"/>
+            <a:ext cx="3657600" cy="4846320"/>
           </a:xfrm>
           <a:prstGeom prst="roundRect">
             <a:avLst/>
@@ -22711,7 +22714,7 @@
         </p:nvSpPr>
         <p:spPr>
           <a:xfrm>
-            <a:off x="8549640" y="5486400"/>
+            <a:off x="8549640" y="6035040"/>
             <a:ext cx="3200400" cy="457200"/>
           </a:xfrm>
           <a:prstGeom prst="roundRect">
@@ -23000,7 +23003,7 @@
           <a:p/>
           <a:p>
             <a:pPr algn="l">
-              <a:defRPr sz="1000" b="0">
+              <a:defRPr sz="1200" b="0">
                 <a:solidFill>
                   <a:srgbClr val="FFFFFF"/>
                 </a:solidFill>
@@ -23061,7 +23064,7 @@
         <p:spPr>
           <a:xfrm>
             <a:off x="91440" y="1828800"/>
-            <a:ext cx="3657600" cy="4572000"/>
+            <a:ext cx="3657600" cy="4846320"/>
           </a:xfrm>
           <a:prstGeom prst="roundRect">
             <a:avLst/>
@@ -23300,7 +23303,7 @@
         </p:nvSpPr>
         <p:spPr>
           <a:xfrm>
-            <a:off x="320040" y="5486400"/>
+            <a:off x="320040" y="6035040"/>
             <a:ext cx="3200400" cy="457200"/>
           </a:xfrm>
           <a:prstGeom prst="roundRect">
@@ -23355,7 +23358,7 @@
         <p:spPr>
           <a:xfrm>
             <a:off x="4206240" y="1828800"/>
-            <a:ext cx="3657600" cy="4572000"/>
+            <a:ext cx="3657600" cy="4846320"/>
           </a:xfrm>
           <a:prstGeom prst="roundRect">
             <a:avLst/>
@@ -23610,7 +23613,7 @@
         </p:nvSpPr>
         <p:spPr>
           <a:xfrm>
-            <a:off x="4434840" y="5486400"/>
+            <a:off x="4434840" y="6035040"/>
             <a:ext cx="3200400" cy="457200"/>
           </a:xfrm>
           <a:prstGeom prst="roundRect">
@@ -23665,7 +23668,7 @@
         <p:spPr>
           <a:xfrm>
             <a:off x="8321040" y="1828800"/>
-            <a:ext cx="3657600" cy="4572000"/>
+            <a:ext cx="3657600" cy="4846320"/>
           </a:xfrm>
           <a:prstGeom prst="roundRect">
             <a:avLst/>
@@ -23864,7 +23867,7 @@
         </p:nvSpPr>
         <p:spPr>
           <a:xfrm>
-            <a:off x="8549640" y="5486400"/>
+            <a:off x="8549640" y="6035040"/>
             <a:ext cx="3200400" cy="457200"/>
           </a:xfrm>
           <a:prstGeom prst="roundRect">
@@ -24153,7 +24156,7 @@
           <a:p/>
           <a:p>
             <a:pPr algn="l">
-              <a:defRPr sz="1000" b="0">
+              <a:defRPr sz="1200" b="0">
                 <a:solidFill>
                   <a:srgbClr val="FFFFFF"/>
                 </a:solidFill>
@@ -24164,7 +24167,7 @@
             </a:r>
             <a:br/>
             <a:r>
-              <a:t> El estudiante no tiene deuda vencida en el sistema.</a:t>
+              <a:t> El estudiante no tiene deuda vencida, lo que impide la aprobación de la beca.</a:t>
             </a:r>
           </a:p>
         </p:txBody>
@@ -24214,7 +24217,7 @@
         <p:spPr>
           <a:xfrm>
             <a:off x="91440" y="1828800"/>
-            <a:ext cx="3657600" cy="4572000"/>
+            <a:ext cx="3657600" cy="4846320"/>
           </a:xfrm>
           <a:prstGeom prst="roundRect">
             <a:avLst/>
@@ -24461,7 +24464,7 @@
         </p:nvSpPr>
         <p:spPr>
           <a:xfrm>
-            <a:off x="320040" y="5486400"/>
+            <a:off x="320040" y="6035040"/>
             <a:ext cx="3200400" cy="457200"/>
           </a:xfrm>
           <a:prstGeom prst="roundRect">
@@ -24516,7 +24519,7 @@
         <p:spPr>
           <a:xfrm>
             <a:off x="4206240" y="1828800"/>
-            <a:ext cx="3657600" cy="4572000"/>
+            <a:ext cx="3657600" cy="4846320"/>
           </a:xfrm>
           <a:prstGeom prst="roundRect">
             <a:avLst/>
@@ -24771,7 +24774,7 @@
         </p:nvSpPr>
         <p:spPr>
           <a:xfrm>
-            <a:off x="4434840" y="5486400"/>
+            <a:off x="4434840" y="6035040"/>
             <a:ext cx="3200400" cy="457200"/>
           </a:xfrm>
           <a:prstGeom prst="roundRect">
@@ -24826,7 +24829,7 @@
         <p:spPr>
           <a:xfrm>
             <a:off x="8321040" y="1828800"/>
-            <a:ext cx="3657600" cy="4572000"/>
+            <a:ext cx="3657600" cy="4846320"/>
           </a:xfrm>
           <a:prstGeom prst="roundRect">
             <a:avLst/>
@@ -25025,7 +25028,7 @@
         </p:nvSpPr>
         <p:spPr>
           <a:xfrm>
-            <a:off x="8549640" y="5486400"/>
+            <a:off x="8549640" y="6035040"/>
             <a:ext cx="3200400" cy="457200"/>
           </a:xfrm>
           <a:prstGeom prst="roundRect">
@@ -25314,7 +25317,7 @@
           <a:p/>
           <a:p>
             <a:pPr algn="l">
-              <a:defRPr sz="1000" b="0">
+              <a:defRPr sz="1200" b="0">
                 <a:solidFill>
                   <a:srgbClr val="FFFFFF"/>
                 </a:solidFill>
@@ -25325,7 +25328,7 @@
             </a:r>
             <a:br/>
             <a:r>
-              <a:t> El estudiante no cumple con el requisito de deuda pendiente.</a:t>
+              <a:t> El estudiante no tiene deuda a cubrir.</a:t>
             </a:r>
           </a:p>
         </p:txBody>
@@ -25375,7 +25378,7 @@
         <p:spPr>
           <a:xfrm>
             <a:off x="91440" y="1828800"/>
-            <a:ext cx="3657600" cy="4572000"/>
+            <a:ext cx="3657600" cy="4846320"/>
           </a:xfrm>
           <a:prstGeom prst="roundRect">
             <a:avLst/>
@@ -25614,7 +25617,7 @@
         </p:nvSpPr>
         <p:spPr>
           <a:xfrm>
-            <a:off x="320040" y="5486400"/>
+            <a:off x="320040" y="6035040"/>
             <a:ext cx="3200400" cy="457200"/>
           </a:xfrm>
           <a:prstGeom prst="roundRect">
@@ -25669,7 +25672,7 @@
         <p:spPr>
           <a:xfrm>
             <a:off x="4206240" y="1828800"/>
-            <a:ext cx="3657600" cy="4572000"/>
+            <a:ext cx="3657600" cy="4846320"/>
           </a:xfrm>
           <a:prstGeom prst="roundRect">
             <a:avLst/>
@@ -25924,7 +25927,7 @@
         </p:nvSpPr>
         <p:spPr>
           <a:xfrm>
-            <a:off x="4434840" y="5486400"/>
+            <a:off x="4434840" y="6035040"/>
             <a:ext cx="3200400" cy="457200"/>
           </a:xfrm>
           <a:prstGeom prst="roundRect">
@@ -25979,7 +25982,7 @@
         <p:spPr>
           <a:xfrm>
             <a:off x="8321040" y="1828800"/>
-            <a:ext cx="3657600" cy="4572000"/>
+            <a:ext cx="3657600" cy="4846320"/>
           </a:xfrm>
           <a:prstGeom prst="roundRect">
             <a:avLst/>
@@ -26103,7 +26106,7 @@
               <a:defRPr sz="1200"/>
             </a:pPr>
             <a:r>
-              <a:t>La solicitud de beca se rechaza porque no hay deuda a cubrir.</a:t>
+              <a:t>La solicitud de beca se rechaza porque la deuda vencida en el sistema es 0.</a:t>
             </a:r>
           </a:p>
         </p:txBody>
@@ -26178,7 +26181,7 @@
         </p:nvSpPr>
         <p:spPr>
           <a:xfrm>
-            <a:off x="8549640" y="5486400"/>
+            <a:off x="8549640" y="6035040"/>
             <a:ext cx="3200400" cy="457200"/>
           </a:xfrm>
           <a:prstGeom prst="roundRect">
@@ -26467,7 +26470,7 @@
           <a:p/>
           <a:p>
             <a:pPr algn="l">
-              <a:defRPr sz="1000" b="0">
+              <a:defRPr sz="1200" b="0">
                 <a:solidFill>
                   <a:srgbClr val="FFFFFF"/>
                 </a:solidFill>
@@ -26528,7 +26531,7 @@
         <p:spPr>
           <a:xfrm>
             <a:off x="91440" y="1828800"/>
-            <a:ext cx="3657600" cy="4572000"/>
+            <a:ext cx="3657600" cy="4846320"/>
           </a:xfrm>
           <a:prstGeom prst="roundRect">
             <a:avLst/>
@@ -26767,7 +26770,7 @@
         </p:nvSpPr>
         <p:spPr>
           <a:xfrm>
-            <a:off x="320040" y="5486400"/>
+            <a:off x="320040" y="6035040"/>
             <a:ext cx="3200400" cy="457200"/>
           </a:xfrm>
           <a:prstGeom prst="roundRect">
@@ -26822,7 +26825,7 @@
         <p:spPr>
           <a:xfrm>
             <a:off x="4206240" y="1828800"/>
-            <a:ext cx="3657600" cy="4572000"/>
+            <a:ext cx="3657600" cy="4846320"/>
           </a:xfrm>
           <a:prstGeom prst="roundRect">
             <a:avLst/>
@@ -27077,7 +27080,7 @@
         </p:nvSpPr>
         <p:spPr>
           <a:xfrm>
-            <a:off x="4434840" y="5486400"/>
+            <a:off x="4434840" y="6035040"/>
             <a:ext cx="3200400" cy="457200"/>
           </a:xfrm>
           <a:prstGeom prst="roundRect">
@@ -27132,7 +27135,7 @@
         <p:spPr>
           <a:xfrm>
             <a:off x="8321040" y="1828800"/>
-            <a:ext cx="3657600" cy="4572000"/>
+            <a:ext cx="3657600" cy="4846320"/>
           </a:xfrm>
           <a:prstGeom prst="roundRect">
             <a:avLst/>
@@ -27256,7 +27259,7 @@
               <a:defRPr sz="1200"/>
             </a:pPr>
             <a:r>
-              <a:t>La solicitud de beca se rechaza porque no hay deuda a cubrir.</a:t>
+              <a:t>La solicitud de beca se rechaza porque no hay deuda vencida que cubrir.</a:t>
             </a:r>
           </a:p>
         </p:txBody>
@@ -27331,7 +27334,7 @@
         </p:nvSpPr>
         <p:spPr>
           <a:xfrm>
-            <a:off x="8549640" y="5486400"/>
+            <a:off x="8549640" y="6035040"/>
             <a:ext cx="3200400" cy="457200"/>
           </a:xfrm>
           <a:prstGeom prst="roundRect">
@@ -27620,7 +27623,7 @@
           <a:p/>
           <a:p>
             <a:pPr algn="l">
-              <a:defRPr sz="1000" b="0">
+              <a:defRPr sz="1200" b="0">
                 <a:solidFill>
                   <a:srgbClr val="FFFFFF"/>
                 </a:solidFill>
@@ -27631,7 +27634,7 @@
             </a:r>
             <a:br/>
             <a:r>
-              <a:t> El estudiante no presenta información suficiente para evaluar su situación.</a:t>
+              <a:t> No se cumple con los requisitos necesarios debido a la falta de datos fundamentales.</a:t>
             </a:r>
           </a:p>
         </p:txBody>
@@ -27681,7 +27684,7 @@
         <p:spPr>
           <a:xfrm>
             <a:off x="91440" y="1828800"/>
-            <a:ext cx="3657600" cy="4572000"/>
+            <a:ext cx="3657600" cy="4846320"/>
           </a:xfrm>
           <a:prstGeom prst="roundRect">
             <a:avLst/>
@@ -27880,7 +27883,7 @@
         </p:nvSpPr>
         <p:spPr>
           <a:xfrm>
-            <a:off x="320040" y="5486400"/>
+            <a:off x="320040" y="6035040"/>
             <a:ext cx="3200400" cy="457200"/>
           </a:xfrm>
           <a:prstGeom prst="roundRect">
@@ -27935,7 +27938,7 @@
         <p:spPr>
           <a:xfrm>
             <a:off x="4206240" y="1828800"/>
-            <a:ext cx="3657600" cy="4572000"/>
+            <a:ext cx="3657600" cy="4846320"/>
           </a:xfrm>
           <a:prstGeom prst="roundRect">
             <a:avLst/>
@@ -28190,7 +28193,7 @@
         </p:nvSpPr>
         <p:spPr>
           <a:xfrm>
-            <a:off x="4434840" y="5486400"/>
+            <a:off x="4434840" y="6035040"/>
             <a:ext cx="3200400" cy="457200"/>
           </a:xfrm>
           <a:prstGeom prst="roundRect">
@@ -28245,7 +28248,7 @@
         <p:spPr>
           <a:xfrm>
             <a:off x="8321040" y="1828800"/>
-            <a:ext cx="3657600" cy="4572000"/>
+            <a:ext cx="3657600" cy="4846320"/>
           </a:xfrm>
           <a:prstGeom prst="roundRect">
             <a:avLst/>
@@ -28369,7 +28372,7 @@
               <a:defRPr sz="1200"/>
             </a:pPr>
             <a:r>
-              <a:t>La solicitud de beca se rechaza debido a que la información proporcionada es insuficiente para realizar una evaluación adecuada.</a:t>
+              <a:t>La solicitud de beca se rechaza porque no hay suficiente información para procesar la solicitud.</a:t>
             </a:r>
           </a:p>
         </p:txBody>
@@ -28444,7 +28447,7 @@
         </p:nvSpPr>
         <p:spPr>
           <a:xfrm>
-            <a:off x="8549640" y="5486400"/>
+            <a:off x="8549640" y="6035040"/>
             <a:ext cx="3200400" cy="457200"/>
           </a:xfrm>
           <a:prstGeom prst="roundRect">
@@ -28733,7 +28736,7 @@
           <a:p/>
           <a:p>
             <a:pPr algn="l">
-              <a:defRPr sz="1000" b="0">
+              <a:defRPr sz="1200" b="0">
                 <a:solidFill>
                   <a:srgbClr val="FFFFFF"/>
                 </a:solidFill>
@@ -28744,7 +28747,7 @@
             </a:r>
             <a:br/>
             <a:r>
-              <a:t> El estudiante solicita una beca porque su familia tiene un ingreso insuficiente para cubrir las necesidades básicas del hogar y ha excedido la duración nominal de gratuidad.</a:t>
+              <a:t> El estudiante solicita una beca porque excede la duración nominal de gratuidad y tiene un ingreso insuficiente para cubrir las necesidades básicas del hogar.</a:t>
             </a:r>
           </a:p>
         </p:txBody>
@@ -28794,7 +28797,7 @@
         <p:spPr>
           <a:xfrm>
             <a:off x="91440" y="1828800"/>
-            <a:ext cx="3657600" cy="4572000"/>
+            <a:ext cx="3657600" cy="4846320"/>
           </a:xfrm>
           <a:prstGeom prst="roundRect">
             <a:avLst/>
@@ -29033,7 +29036,7 @@
         </p:nvSpPr>
         <p:spPr>
           <a:xfrm>
-            <a:off x="320040" y="5486400"/>
+            <a:off x="320040" y="6035040"/>
             <a:ext cx="3200400" cy="457200"/>
           </a:xfrm>
           <a:prstGeom prst="roundRect">
@@ -29088,7 +29091,7 @@
         <p:spPr>
           <a:xfrm>
             <a:off x="4206240" y="1828800"/>
-            <a:ext cx="3657600" cy="4572000"/>
+            <a:ext cx="3657600" cy="4846320"/>
           </a:xfrm>
           <a:prstGeom prst="roundRect">
             <a:avLst/>
@@ -29343,7 +29346,7 @@
         </p:nvSpPr>
         <p:spPr>
           <a:xfrm>
-            <a:off x="4434840" y="5486400"/>
+            <a:off x="4434840" y="6035040"/>
             <a:ext cx="3200400" cy="457200"/>
           </a:xfrm>
           <a:prstGeom prst="roundRect">
@@ -29398,7 +29401,7 @@
         <p:spPr>
           <a:xfrm>
             <a:off x="8321040" y="1828800"/>
-            <a:ext cx="3657600" cy="4572000"/>
+            <a:ext cx="3657600" cy="4846320"/>
           </a:xfrm>
           <a:prstGeom prst="roundRect">
             <a:avLst/>
@@ -29522,7 +29525,7 @@
               <a:defRPr sz="1200"/>
             </a:pPr>
             <a:r>
-              <a:t>La solicitud de beca se aprueba con base en la validación de documentos y existencia de deuda vencida.</a:t>
+              <a:t>La solicitud de beca se aprueba debido a que el estudiante tiene deuda vencida y los documentos han sido validados por la Trabajadora Social.</a:t>
             </a:r>
           </a:p>
         </p:txBody>
@@ -29597,7 +29600,7 @@
         </p:nvSpPr>
         <p:spPr>
           <a:xfrm>
-            <a:off x="8549640" y="5486400"/>
+            <a:off x="8549640" y="6035040"/>
             <a:ext cx="3200400" cy="457200"/>
           </a:xfrm>
           <a:prstGeom prst="roundRect">
@@ -29886,7 +29889,7 @@
           <a:p/>
           <a:p>
             <a:pPr algn="l">
-              <a:defRPr sz="1000" b="0">
+              <a:defRPr sz="1200" b="0">
                 <a:solidFill>
                   <a:srgbClr val="FFFFFF"/>
                 </a:solidFill>
@@ -29897,7 +29900,7 @@
             </a:r>
             <a:br/>
             <a:r>
-              <a:t> El estudiante solicita una beca debido a su situación económica, encontrándose actualmente cesante y con ingreso informal.</a:t>
+              <a:t> El estudiante solicita una beca por su situación económica que incluye cesantía y un ingreso informal.</a:t>
             </a:r>
           </a:p>
         </p:txBody>
@@ -29947,7 +29950,7 @@
         <p:spPr>
           <a:xfrm>
             <a:off x="91440" y="1828800"/>
-            <a:ext cx="3657600" cy="4572000"/>
+            <a:ext cx="3657600" cy="4846320"/>
           </a:xfrm>
           <a:prstGeom prst="roundRect">
             <a:avLst/>
@@ -30194,7 +30197,7 @@
         </p:nvSpPr>
         <p:spPr>
           <a:xfrm>
-            <a:off x="320040" y="5486400"/>
+            <a:off x="320040" y="6035040"/>
             <a:ext cx="3200400" cy="457200"/>
           </a:xfrm>
           <a:prstGeom prst="roundRect">
@@ -30249,7 +30252,7 @@
         <p:spPr>
           <a:xfrm>
             <a:off x="4206240" y="1828800"/>
-            <a:ext cx="3657600" cy="4572000"/>
+            <a:ext cx="3657600" cy="4846320"/>
           </a:xfrm>
           <a:prstGeom prst="roundRect">
             <a:avLst/>
@@ -30504,7 +30507,7 @@
         </p:nvSpPr>
         <p:spPr>
           <a:xfrm>
-            <a:off x="4434840" y="5486400"/>
+            <a:off x="4434840" y="6035040"/>
             <a:ext cx="3200400" cy="457200"/>
           </a:xfrm>
           <a:prstGeom prst="roundRect">
@@ -30559,7 +30562,7 @@
         <p:spPr>
           <a:xfrm>
             <a:off x="8321040" y="1828800"/>
-            <a:ext cx="3657600" cy="4572000"/>
+            <a:ext cx="3657600" cy="4846320"/>
           </a:xfrm>
           <a:prstGeom prst="roundRect">
             <a:avLst/>
@@ -30683,7 +30686,7 @@
               <a:defRPr sz="1200"/>
             </a:pPr>
             <a:r>
-              <a:t>La solicitud de beca se aprueba debido a que los documentos han sido validados por una Trabajadora Social y el estudiante tiene una deuda vencida mayor que 0.</a:t>
+              <a:t>La solicitud de beca se aprueba porque los documentos han sido validados y el estudiante tiene una deuda vencida mayor que 0.</a:t>
             </a:r>
           </a:p>
         </p:txBody>
@@ -30758,7 +30761,7 @@
         </p:nvSpPr>
         <p:spPr>
           <a:xfrm>
-            <a:off x="8549640" y="5486400"/>
+            <a:off x="8549640" y="6035040"/>
             <a:ext cx="3200400" cy="457200"/>
           </a:xfrm>
           <a:prstGeom prst="roundRect">
@@ -31047,7 +31050,7 @@
           <a:p/>
           <a:p>
             <a:pPr algn="l">
-              <a:defRPr sz="1000" b="0">
+              <a:defRPr sz="1200" b="0">
                 <a:solidFill>
                   <a:srgbClr val="FFFFFF"/>
                 </a:solidFill>
@@ -31108,7 +31111,7 @@
         <p:spPr>
           <a:xfrm>
             <a:off x="91440" y="1828800"/>
-            <a:ext cx="3657600" cy="4572000"/>
+            <a:ext cx="3657600" cy="4846320"/>
           </a:xfrm>
           <a:prstGeom prst="roundRect">
             <a:avLst/>
@@ -31355,7 +31358,7 @@
         </p:nvSpPr>
         <p:spPr>
           <a:xfrm>
-            <a:off x="320040" y="5486400"/>
+            <a:off x="320040" y="6035040"/>
             <a:ext cx="3200400" cy="457200"/>
           </a:xfrm>
           <a:prstGeom prst="roundRect">
@@ -31410,7 +31413,7 @@
         <p:spPr>
           <a:xfrm>
             <a:off x="4206240" y="1828800"/>
-            <a:ext cx="3657600" cy="4572000"/>
+            <a:ext cx="3657600" cy="4846320"/>
           </a:xfrm>
           <a:prstGeom prst="roundRect">
             <a:avLst/>
@@ -31665,7 +31668,7 @@
         </p:nvSpPr>
         <p:spPr>
           <a:xfrm>
-            <a:off x="4434840" y="5486400"/>
+            <a:off x="4434840" y="6035040"/>
             <a:ext cx="3200400" cy="457200"/>
           </a:xfrm>
           <a:prstGeom prst="roundRect">
@@ -31720,7 +31723,7 @@
         <p:spPr>
           <a:xfrm>
             <a:off x="8321040" y="1828800"/>
-            <a:ext cx="3657600" cy="4572000"/>
+            <a:ext cx="3657600" cy="4846320"/>
           </a:xfrm>
           <a:prstGeom prst="roundRect">
             <a:avLst/>
@@ -31919,7 +31922,7 @@
         </p:nvSpPr>
         <p:spPr>
           <a:xfrm>
-            <a:off x="8549640" y="5486400"/>
+            <a:off x="8549640" y="6035040"/>
             <a:ext cx="3200400" cy="457200"/>
           </a:xfrm>
           <a:prstGeom prst="roundRect">
@@ -32208,7 +32211,7 @@
           <a:p/>
           <a:p>
             <a:pPr algn="l">
-              <a:defRPr sz="1000" b="0">
+              <a:defRPr sz="1200" b="0">
                 <a:solidFill>
                   <a:srgbClr val="FFFFFF"/>
                 </a:solidFill>
@@ -32269,7 +32272,7 @@
         <p:spPr>
           <a:xfrm>
             <a:off x="91440" y="1828800"/>
-            <a:ext cx="3657600" cy="4572000"/>
+            <a:ext cx="3657600" cy="4846320"/>
           </a:xfrm>
           <a:prstGeom prst="roundRect">
             <a:avLst/>
@@ -32516,7 +32519,7 @@
         </p:nvSpPr>
         <p:spPr>
           <a:xfrm>
-            <a:off x="320040" y="5486400"/>
+            <a:off x="320040" y="6035040"/>
             <a:ext cx="3200400" cy="457200"/>
           </a:xfrm>
           <a:prstGeom prst="roundRect">
@@ -32571,7 +32574,7 @@
         <p:spPr>
           <a:xfrm>
             <a:off x="4206240" y="1828800"/>
-            <a:ext cx="3657600" cy="4572000"/>
+            <a:ext cx="3657600" cy="4846320"/>
           </a:xfrm>
           <a:prstGeom prst="roundRect">
             <a:avLst/>
@@ -32826,7 +32829,7 @@
         </p:nvSpPr>
         <p:spPr>
           <a:xfrm>
-            <a:off x="4434840" y="5486400"/>
+            <a:off x="4434840" y="6035040"/>
             <a:ext cx="3200400" cy="457200"/>
           </a:xfrm>
           <a:prstGeom prst="roundRect">
@@ -32881,7 +32884,7 @@
         <p:spPr>
           <a:xfrm>
             <a:off x="8321040" y="1828800"/>
-            <a:ext cx="3657600" cy="4572000"/>
+            <a:ext cx="3657600" cy="4846320"/>
           </a:xfrm>
           <a:prstGeom prst="roundRect">
             <a:avLst/>
@@ -33080,7 +33083,7 @@
         </p:nvSpPr>
         <p:spPr>
           <a:xfrm>
-            <a:off x="8549640" y="5486400"/>
+            <a:off x="8549640" y="6035040"/>
             <a:ext cx="3200400" cy="457200"/>
           </a:xfrm>
           <a:prstGeom prst="roundRect">
@@ -33369,7 +33372,7 @@
           <a:p/>
           <a:p>
             <a:pPr algn="l">
-              <a:defRPr sz="1000" b="0">
+              <a:defRPr sz="1200" b="0">
                 <a:solidFill>
                   <a:srgbClr val="FFFFFF"/>
                 </a:solidFill>
@@ -33380,7 +33383,7 @@
             </a:r>
             <a:br/>
             <a:r>
-              <a:t> El estudiante no tiene deuda vencida que justifique la solicitud de beca.</a:t>
+              <a:t> El estudiante no tiene deuda vencida registrada.</a:t>
             </a:r>
           </a:p>
         </p:txBody>
@@ -33430,7 +33433,7 @@
         <p:spPr>
           <a:xfrm>
             <a:off x="91440" y="1828800"/>
-            <a:ext cx="3657600" cy="4572000"/>
+            <a:ext cx="3657600" cy="4846320"/>
           </a:xfrm>
           <a:prstGeom prst="roundRect">
             <a:avLst/>
@@ -33685,7 +33688,7 @@
         </p:nvSpPr>
         <p:spPr>
           <a:xfrm>
-            <a:off x="320040" y="5486400"/>
+            <a:off x="320040" y="6035040"/>
             <a:ext cx="3200400" cy="457200"/>
           </a:xfrm>
           <a:prstGeom prst="roundRect">
@@ -33740,7 +33743,7 @@
         <p:spPr>
           <a:xfrm>
             <a:off x="4206240" y="1828800"/>
-            <a:ext cx="3657600" cy="4572000"/>
+            <a:ext cx="3657600" cy="4846320"/>
           </a:xfrm>
           <a:prstGeom prst="roundRect">
             <a:avLst/>
@@ -33995,7 +33998,7 @@
         </p:nvSpPr>
         <p:spPr>
           <a:xfrm>
-            <a:off x="4434840" y="5486400"/>
+            <a:off x="4434840" y="6035040"/>
             <a:ext cx="3200400" cy="457200"/>
           </a:xfrm>
           <a:prstGeom prst="roundRect">
@@ -34050,7 +34053,7 @@
         <p:spPr>
           <a:xfrm>
             <a:off x="8321040" y="1828800"/>
-            <a:ext cx="3657600" cy="4572000"/>
+            <a:ext cx="3657600" cy="4846320"/>
           </a:xfrm>
           <a:prstGeom prst="roundRect">
             <a:avLst/>
@@ -34174,7 +34177,7 @@
               <a:defRPr sz="1200"/>
             </a:pPr>
             <a:r>
-              <a:t>La solicitud de beca se rechaza porque no hay deuda a cubrir.</a:t>
+              <a:t>La solicitud de beca se rechaza porque no hay deuda a cubrir en el sistema.</a:t>
             </a:r>
           </a:p>
         </p:txBody>
@@ -34249,7 +34252,7 @@
         </p:nvSpPr>
         <p:spPr>
           <a:xfrm>
-            <a:off x="8549640" y="5486400"/>
+            <a:off x="8549640" y="6035040"/>
             <a:ext cx="3200400" cy="457200"/>
           </a:xfrm>
           <a:prstGeom prst="roundRect">
@@ -34538,7 +34541,7 @@
           <a:p/>
           <a:p>
             <a:pPr algn="l">
-              <a:defRPr sz="1000" b="0">
+              <a:defRPr sz="1200" b="0">
                 <a:solidFill>
                   <a:srgbClr val="FFFFFF"/>
                 </a:solidFill>
@@ -34599,7 +34602,7 @@
         <p:spPr>
           <a:xfrm>
             <a:off x="91440" y="1828800"/>
-            <a:ext cx="3657600" cy="4572000"/>
+            <a:ext cx="3657600" cy="4846320"/>
           </a:xfrm>
           <a:prstGeom prst="roundRect">
             <a:avLst/>
@@ -34838,7 +34841,7 @@
         </p:nvSpPr>
         <p:spPr>
           <a:xfrm>
-            <a:off x="320040" y="5486400"/>
+            <a:off x="320040" y="6035040"/>
             <a:ext cx="3200400" cy="457200"/>
           </a:xfrm>
           <a:prstGeom prst="roundRect">
@@ -34893,7 +34896,7 @@
         <p:spPr>
           <a:xfrm>
             <a:off x="4206240" y="1828800"/>
-            <a:ext cx="3657600" cy="4572000"/>
+            <a:ext cx="3657600" cy="4846320"/>
           </a:xfrm>
           <a:prstGeom prst="roundRect">
             <a:avLst/>
@@ -35148,7 +35151,7 @@
         </p:nvSpPr>
         <p:spPr>
           <a:xfrm>
-            <a:off x="4434840" y="5486400"/>
+            <a:off x="4434840" y="6035040"/>
             <a:ext cx="3200400" cy="457200"/>
           </a:xfrm>
           <a:prstGeom prst="roundRect">
@@ -35203,7 +35206,7 @@
         <p:spPr>
           <a:xfrm>
             <a:off x="8321040" y="1828800"/>
-            <a:ext cx="3657600" cy="4572000"/>
+            <a:ext cx="3657600" cy="4846320"/>
           </a:xfrm>
           <a:prstGeom prst="roundRect">
             <a:avLst/>
@@ -35402,7 +35405,7 @@
         </p:nvSpPr>
         <p:spPr>
           <a:xfrm>
-            <a:off x="8549640" y="5486400"/>
+            <a:off x="8549640" y="6035040"/>
             <a:ext cx="3200400" cy="457200"/>
           </a:xfrm>
           <a:prstGeom prst="roundRect">
@@ -35691,7 +35694,7 @@
           <a:p/>
           <a:p>
             <a:pPr algn="l">
-              <a:defRPr sz="1000" b="0">
+              <a:defRPr sz="1200" b="0">
                 <a:solidFill>
                   <a:srgbClr val="FFFFFF"/>
                 </a:solidFill>
@@ -35702,7 +35705,7 @@
             </a:r>
             <a:br/>
             <a:r>
-              <a:t> El estudiante solicita una beca para cubrir su deuda vencida y ha sido evaluado positivamente por la Trabajadora Social.</a:t>
+              <a:t> El estudiante solicita una beca para cubrir su deuda vencida, y se ha validado su situación por la Trabajadora Social.</a:t>
             </a:r>
           </a:p>
         </p:txBody>
@@ -35752,7 +35755,7 @@
         <p:spPr>
           <a:xfrm>
             <a:off x="91440" y="1828800"/>
-            <a:ext cx="3657600" cy="4572000"/>
+            <a:ext cx="3657600" cy="4846320"/>
           </a:xfrm>
           <a:prstGeom prst="roundRect">
             <a:avLst/>
@@ -35999,7 +36002,7 @@
         </p:nvSpPr>
         <p:spPr>
           <a:xfrm>
-            <a:off x="320040" y="5486400"/>
+            <a:off x="320040" y="6035040"/>
             <a:ext cx="3200400" cy="457200"/>
           </a:xfrm>
           <a:prstGeom prst="roundRect">
@@ -36054,7 +36057,7 @@
         <p:spPr>
           <a:xfrm>
             <a:off x="4206240" y="1828800"/>
-            <a:ext cx="3657600" cy="4572000"/>
+            <a:ext cx="3657600" cy="4846320"/>
           </a:xfrm>
           <a:prstGeom prst="roundRect">
             <a:avLst/>
@@ -36309,7 +36312,7 @@
         </p:nvSpPr>
         <p:spPr>
           <a:xfrm>
-            <a:off x="4434840" y="5486400"/>
+            <a:off x="4434840" y="6035040"/>
             <a:ext cx="3200400" cy="457200"/>
           </a:xfrm>
           <a:prstGeom prst="roundRect">
@@ -36364,7 +36367,7 @@
         <p:spPr>
           <a:xfrm>
             <a:off x="8321040" y="1828800"/>
-            <a:ext cx="3657600" cy="4572000"/>
+            <a:ext cx="3657600" cy="4846320"/>
           </a:xfrm>
           <a:prstGeom prst="roundRect">
             <a:avLst/>
@@ -36488,7 +36491,7 @@
               <a:defRPr sz="1200"/>
             </a:pPr>
             <a:r>
-              <a:t>La solicitud de beca se aprueba porque los documentos han sido validados por una Trabajadora Social y el estudiante tiene una deuda vencida mayor que 0.</a:t>
+              <a:t>La solicitud de beca se aprueba debido a que el estudiante cumple con los requisitos necesarios y tiene una deuda vencida.</a:t>
             </a:r>
           </a:p>
         </p:txBody>
@@ -36563,7 +36566,7 @@
         </p:nvSpPr>
         <p:spPr>
           <a:xfrm>
-            <a:off x="8549640" y="5486400"/>
+            <a:off x="8549640" y="6035040"/>
             <a:ext cx="3200400" cy="457200"/>
           </a:xfrm>
           <a:prstGeom prst="roundRect">

</xml_diff>